<commit_message>
post session fixes to slides
</commit_message>
<xml_diff>
--- a/slides/Session1_master.pptx
+++ b/slides/Session1_master.pptx
@@ -2,35 +2,35 @@
 <file path=ppt/presentation.xml><?xml version="1.0" encoding="utf-8"?>
 <p:presentation xmlns:a="http://schemas.openxmlformats.org/drawingml/2006/main" xmlns:r="http://schemas.openxmlformats.org/officeDocument/2006/relationships" xmlns:p="http://schemas.openxmlformats.org/presentationml/2006/main" autoCompressPictures="0">
   <p:sldMasterIdLst>
-    <p:sldMasterId id="2147483648" r:id="rId1"/>
+    <p:sldMasterId id="2147483648" r:id="rId4"/>
   </p:sldMasterIdLst>
   <p:notesMasterIdLst>
-    <p:notesMasterId r:id="rId25"/>
+    <p:notesMasterId r:id="rId28"/>
   </p:notesMasterIdLst>
   <p:sldIdLst>
-    <p:sldId id="256" r:id="rId2"/>
-    <p:sldId id="388" r:id="rId3"/>
-    <p:sldId id="391" r:id="rId4"/>
-    <p:sldId id="392" r:id="rId5"/>
-    <p:sldId id="393" r:id="rId6"/>
-    <p:sldId id="329" r:id="rId7"/>
-    <p:sldId id="389" r:id="rId8"/>
-    <p:sldId id="390" r:id="rId9"/>
-    <p:sldId id="386" r:id="rId10"/>
-    <p:sldId id="387" r:id="rId11"/>
-    <p:sldId id="406" r:id="rId12"/>
-    <p:sldId id="407" r:id="rId13"/>
-    <p:sldId id="408" r:id="rId14"/>
-    <p:sldId id="384" r:id="rId15"/>
-    <p:sldId id="400" r:id="rId16"/>
-    <p:sldId id="397" r:id="rId17"/>
-    <p:sldId id="399" r:id="rId18"/>
-    <p:sldId id="401" r:id="rId19"/>
-    <p:sldId id="331" r:id="rId20"/>
-    <p:sldId id="402" r:id="rId21"/>
-    <p:sldId id="403" r:id="rId22"/>
-    <p:sldId id="404" r:id="rId23"/>
-    <p:sldId id="405" r:id="rId24"/>
+    <p:sldId id="256" r:id="rId5"/>
+    <p:sldId id="388" r:id="rId6"/>
+    <p:sldId id="391" r:id="rId7"/>
+    <p:sldId id="392" r:id="rId8"/>
+    <p:sldId id="393" r:id="rId9"/>
+    <p:sldId id="329" r:id="rId10"/>
+    <p:sldId id="389" r:id="rId11"/>
+    <p:sldId id="390" r:id="rId12"/>
+    <p:sldId id="386" r:id="rId13"/>
+    <p:sldId id="387" r:id="rId14"/>
+    <p:sldId id="406" r:id="rId15"/>
+    <p:sldId id="407" r:id="rId16"/>
+    <p:sldId id="408" r:id="rId17"/>
+    <p:sldId id="384" r:id="rId18"/>
+    <p:sldId id="400" r:id="rId19"/>
+    <p:sldId id="397" r:id="rId20"/>
+    <p:sldId id="399" r:id="rId21"/>
+    <p:sldId id="401" r:id="rId22"/>
+    <p:sldId id="331" r:id="rId23"/>
+    <p:sldId id="402" r:id="rId24"/>
+    <p:sldId id="403" r:id="rId25"/>
+    <p:sldId id="404" r:id="rId26"/>
+    <p:sldId id="405" r:id="rId27"/>
   </p:sldIdLst>
   <p:sldSz cx="12192000" cy="6858000"/>
   <p:notesSz cx="6858000" cy="9144000"/>
@@ -182,7 +182,7 @@
 
 <file path=ppt/commentAuthors.xml><?xml version="1.0" encoding="utf-8"?>
 <p:cmAuthorLst xmlns:a="http://schemas.openxmlformats.org/drawingml/2006/main" xmlns:r="http://schemas.openxmlformats.org/officeDocument/2006/relationships" xmlns:p="http://schemas.openxmlformats.org/presentationml/2006/main">
-  <p:cmAuthor id="1" name="Liam Hill" initials="LH" lastIdx="18" clrIdx="0">
+  <p:cmAuthor id="1" name="Liam Hill" initials="LH" lastIdx="20" clrIdx="0">
     <p:extLst>
       <p:ext uri="{19B8F6BF-5375-455C-9EA6-DF929625EA0E}">
         <p15:presenceInfo xmlns:p15="http://schemas.microsoft.com/office/powerpoint/2012/main" userId="S::lhill3@ed.ac.uk::cf4eacb2-5eb2-4c8d-8100-2f2500eca56b" providerId="AD"/>
@@ -195,208 +195,50 @@
 <file path=ppt/changesInfos/changesInfo1.xml><?xml version="1.0" encoding="utf-8"?>
 <pc:chgInfo xmlns:a="http://schemas.openxmlformats.org/drawingml/2006/main" xmlns:r="http://schemas.openxmlformats.org/officeDocument/2006/relationships" xmlns:ac="http://schemas.microsoft.com/office/drawing/2013/main/command" xmlns:pc="http://schemas.microsoft.com/office/powerpoint/2013/main/command">
   <pc:docChgLst>
-    <pc:chgData name="Liam Hill" userId="cf4eacb2-5eb2-4c8d-8100-2f2500eca56b" providerId="ADAL" clId="{866E4030-04E4-443C-BDCF-B74C0CDE85E1}"/>
-    <pc:docChg chg="undo custSel modSld">
-      <pc:chgData name="Liam Hill" userId="cf4eacb2-5eb2-4c8d-8100-2f2500eca56b" providerId="ADAL" clId="{866E4030-04E4-443C-BDCF-B74C0CDE85E1}" dt="2025-06-10T20:29:13.631" v="1120" actId="20577"/>
+    <pc:chgData name="Liam Hill" userId="cf4eacb2-5eb2-4c8d-8100-2f2500eca56b" providerId="ADAL" clId="{CA0B1BAB-C301-4F38-805F-A6BFA8AAEC08}"/>
+    <pc:docChg chg="custSel modSld">
+      <pc:chgData name="Liam Hill" userId="cf4eacb2-5eb2-4c8d-8100-2f2500eca56b" providerId="ADAL" clId="{CA0B1BAB-C301-4F38-805F-A6BFA8AAEC08}" dt="2025-06-13T08:53:42.430" v="1"/>
       <pc:docMkLst>
         <pc:docMk/>
       </pc:docMkLst>
-      <pc:sldChg chg="modSp mod">
-        <pc:chgData name="Liam Hill" userId="cf4eacb2-5eb2-4c8d-8100-2f2500eca56b" providerId="ADAL" clId="{866E4030-04E4-443C-BDCF-B74C0CDE85E1}" dt="2025-06-10T17:29:49.041" v="116" actId="20577"/>
+      <pc:sldChg chg="addCm modCm">
+        <pc:chgData name="Liam Hill" userId="cf4eacb2-5eb2-4c8d-8100-2f2500eca56b" providerId="ADAL" clId="{CA0B1BAB-C301-4F38-805F-A6BFA8AAEC08}" dt="2025-06-13T08:53:42.430" v="1"/>
         <pc:sldMkLst>
           <pc:docMk/>
-          <pc:sldMk cId="3055714642" sldId="397"/>
+          <pc:sldMk cId="4270276616" sldId="331"/>
         </pc:sldMkLst>
-        <pc:spChg chg="mod">
-          <ac:chgData name="Liam Hill" userId="cf4eacb2-5eb2-4c8d-8100-2f2500eca56b" providerId="ADAL" clId="{866E4030-04E4-443C-BDCF-B74C0CDE85E1}" dt="2025-06-10T17:29:49.041" v="116" actId="20577"/>
-          <ac:spMkLst>
-            <pc:docMk/>
-            <pc:sldMk cId="3055714642" sldId="397"/>
-            <ac:spMk id="3" creationId="{AF4FA8D0-3A13-46EE-9B64-1CEE604D3E63}"/>
-          </ac:spMkLst>
-        </pc:spChg>
-      </pc:sldChg>
-      <pc:sldChg chg="addSp modSp mod">
-        <pc:chgData name="Liam Hill" userId="cf4eacb2-5eb2-4c8d-8100-2f2500eca56b" providerId="ADAL" clId="{866E4030-04E4-443C-BDCF-B74C0CDE85E1}" dt="2025-06-10T18:53:30.362" v="345" actId="14100"/>
-        <pc:sldMkLst>
-          <pc:docMk/>
-          <pc:sldMk cId="2522688967" sldId="399"/>
-        </pc:sldMkLst>
-        <pc:spChg chg="mod">
-          <ac:chgData name="Liam Hill" userId="cf4eacb2-5eb2-4c8d-8100-2f2500eca56b" providerId="ADAL" clId="{866E4030-04E4-443C-BDCF-B74C0CDE85E1}" dt="2025-06-10T17:32:41.988" v="281" actId="20577"/>
-          <ac:spMkLst>
-            <pc:docMk/>
-            <pc:sldMk cId="2522688967" sldId="399"/>
-            <ac:spMk id="3" creationId="{AF4FA8D0-3A13-46EE-9B64-1CEE604D3E63}"/>
-          </ac:spMkLst>
-        </pc:spChg>
-        <pc:spChg chg="add mod">
-          <ac:chgData name="Liam Hill" userId="cf4eacb2-5eb2-4c8d-8100-2f2500eca56b" providerId="ADAL" clId="{866E4030-04E4-443C-BDCF-B74C0CDE85E1}" dt="2025-06-10T18:53:30.362" v="345" actId="14100"/>
-          <ac:spMkLst>
-            <pc:docMk/>
-            <pc:sldMk cId="2522688967" sldId="399"/>
-            <ac:spMk id="4" creationId="{92EE5FC4-76A6-4F9D-95B8-A514583B0D6E}"/>
-          </ac:spMkLst>
-        </pc:spChg>
-      </pc:sldChg>
-      <pc:sldChg chg="modSp mod">
-        <pc:chgData name="Liam Hill" userId="cf4eacb2-5eb2-4c8d-8100-2f2500eca56b" providerId="ADAL" clId="{866E4030-04E4-443C-BDCF-B74C0CDE85E1}" dt="2025-06-10T20:24:54.358" v="807"/>
-        <pc:sldMkLst>
-          <pc:docMk/>
-          <pc:sldMk cId="2447090272" sldId="401"/>
-        </pc:sldMkLst>
-        <pc:spChg chg="mod">
-          <ac:chgData name="Liam Hill" userId="cf4eacb2-5eb2-4c8d-8100-2f2500eca56b" providerId="ADAL" clId="{866E4030-04E4-443C-BDCF-B74C0CDE85E1}" dt="2025-06-10T20:24:54.358" v="807"/>
-          <ac:spMkLst>
-            <pc:docMk/>
-            <pc:sldMk cId="2447090272" sldId="401"/>
-            <ac:spMk id="3" creationId="{E9774602-6928-4726-BC4A-7EF9F6678A23}"/>
-          </ac:spMkLst>
-        </pc:spChg>
-      </pc:sldChg>
-      <pc:sldChg chg="modSp mod">
-        <pc:chgData name="Liam Hill" userId="cf4eacb2-5eb2-4c8d-8100-2f2500eca56b" providerId="ADAL" clId="{866E4030-04E4-443C-BDCF-B74C0CDE85E1}" dt="2025-06-10T20:28:47.758" v="1111" actId="114"/>
-        <pc:sldMkLst>
-          <pc:docMk/>
-          <pc:sldMk cId="2860962042" sldId="402"/>
-        </pc:sldMkLst>
-        <pc:spChg chg="mod">
-          <ac:chgData name="Liam Hill" userId="cf4eacb2-5eb2-4c8d-8100-2f2500eca56b" providerId="ADAL" clId="{866E4030-04E4-443C-BDCF-B74C0CDE85E1}" dt="2025-06-10T20:28:47.758" v="1111" actId="114"/>
-          <ac:spMkLst>
-            <pc:docMk/>
-            <pc:sldMk cId="2860962042" sldId="402"/>
-            <ac:spMk id="3" creationId="{E9774602-6928-4726-BC4A-7EF9F6678A23}"/>
-          </ac:spMkLst>
-        </pc:spChg>
-      </pc:sldChg>
-      <pc:sldChg chg="addSp modSp mod">
-        <pc:chgData name="Liam Hill" userId="cf4eacb2-5eb2-4c8d-8100-2f2500eca56b" providerId="ADAL" clId="{866E4030-04E4-443C-BDCF-B74C0CDE85E1}" dt="2025-06-10T20:29:13.631" v="1120" actId="20577"/>
-        <pc:sldMkLst>
-          <pc:docMk/>
-          <pc:sldMk cId="157168131" sldId="403"/>
-        </pc:sldMkLst>
-        <pc:spChg chg="mod">
-          <ac:chgData name="Liam Hill" userId="cf4eacb2-5eb2-4c8d-8100-2f2500eca56b" providerId="ADAL" clId="{866E4030-04E4-443C-BDCF-B74C0CDE85E1}" dt="2025-06-10T20:29:13.631" v="1120" actId="20577"/>
-          <ac:spMkLst>
-            <pc:docMk/>
-            <pc:sldMk cId="157168131" sldId="403"/>
-            <ac:spMk id="3" creationId="{E9774602-6928-4726-BC4A-7EF9F6678A23}"/>
-          </ac:spMkLst>
-        </pc:spChg>
-        <pc:spChg chg="add mod">
-          <ac:chgData name="Liam Hill" userId="cf4eacb2-5eb2-4c8d-8100-2f2500eca56b" providerId="ADAL" clId="{866E4030-04E4-443C-BDCF-B74C0CDE85E1}" dt="2025-06-10T20:26:26.126" v="868" actId="14100"/>
-          <ac:spMkLst>
-            <pc:docMk/>
-            <pc:sldMk cId="157168131" sldId="403"/>
-            <ac:spMk id="4" creationId="{E40C7192-7F4D-4134-863A-E2789CDB667D}"/>
-          </ac:spMkLst>
-        </pc:spChg>
-      </pc:sldChg>
-      <pc:sldChg chg="addSp modSp mod">
-        <pc:chgData name="Liam Hill" userId="cf4eacb2-5eb2-4c8d-8100-2f2500eca56b" providerId="ADAL" clId="{866E4030-04E4-443C-BDCF-B74C0CDE85E1}" dt="2025-06-10T20:27:37.442" v="1003" actId="20577"/>
-        <pc:sldMkLst>
-          <pc:docMk/>
-          <pc:sldMk cId="2093968592" sldId="404"/>
-        </pc:sldMkLst>
-        <pc:spChg chg="mod">
-          <ac:chgData name="Liam Hill" userId="cf4eacb2-5eb2-4c8d-8100-2f2500eca56b" providerId="ADAL" clId="{866E4030-04E4-443C-BDCF-B74C0CDE85E1}" dt="2025-06-10T20:27:37.442" v="1003" actId="20577"/>
-          <ac:spMkLst>
-            <pc:docMk/>
-            <pc:sldMk cId="2093968592" sldId="404"/>
-            <ac:spMk id="3" creationId="{E9774602-6928-4726-BC4A-7EF9F6678A23}"/>
-          </ac:spMkLst>
-        </pc:spChg>
-        <pc:spChg chg="add mod">
-          <ac:chgData name="Liam Hill" userId="cf4eacb2-5eb2-4c8d-8100-2f2500eca56b" providerId="ADAL" clId="{866E4030-04E4-443C-BDCF-B74C0CDE85E1}" dt="2025-06-10T20:27:31.196" v="999" actId="20577"/>
-          <ac:spMkLst>
-            <pc:docMk/>
-            <pc:sldMk cId="2093968592" sldId="404"/>
-            <ac:spMk id="4" creationId="{E570E989-792C-4011-B5A1-DA30D018740A}"/>
-          </ac:spMkLst>
-        </pc:spChg>
-      </pc:sldChg>
-      <pc:sldChg chg="addSp delSp modSp mod delAnim modAnim">
-        <pc:chgData name="Liam Hill" userId="cf4eacb2-5eb2-4c8d-8100-2f2500eca56b" providerId="ADAL" clId="{866E4030-04E4-443C-BDCF-B74C0CDE85E1}" dt="2025-06-10T19:12:45.264" v="732" actId="20577"/>
-        <pc:sldMkLst>
-          <pc:docMk/>
-          <pc:sldMk cId="405315113" sldId="405"/>
-        </pc:sldMkLst>
-        <pc:spChg chg="mod">
-          <ac:chgData name="Liam Hill" userId="cf4eacb2-5eb2-4c8d-8100-2f2500eca56b" providerId="ADAL" clId="{866E4030-04E4-443C-BDCF-B74C0CDE85E1}" dt="2025-06-10T19:11:10.264" v="658" actId="1076"/>
-          <ac:spMkLst>
-            <pc:docMk/>
-            <pc:sldMk cId="405315113" sldId="405"/>
-            <ac:spMk id="3" creationId="{E9774602-6928-4726-BC4A-7EF9F6678A23}"/>
-          </ac:spMkLst>
-        </pc:spChg>
-        <pc:spChg chg="add mod">
-          <ac:chgData name="Liam Hill" userId="cf4eacb2-5eb2-4c8d-8100-2f2500eca56b" providerId="ADAL" clId="{866E4030-04E4-443C-BDCF-B74C0CDE85E1}" dt="2025-06-10T19:10:52.638" v="653" actId="1076"/>
-          <ac:spMkLst>
-            <pc:docMk/>
-            <pc:sldMk cId="405315113" sldId="405"/>
-            <ac:spMk id="6" creationId="{90DB7611-2B76-47B5-BA3D-7CC10D6F46F2}"/>
-          </ac:spMkLst>
-        </pc:spChg>
-        <pc:spChg chg="add mod">
-          <ac:chgData name="Liam Hill" userId="cf4eacb2-5eb2-4c8d-8100-2f2500eca56b" providerId="ADAL" clId="{866E4030-04E4-443C-BDCF-B74C0CDE85E1}" dt="2025-06-10T19:10:52.638" v="653" actId="1076"/>
-          <ac:spMkLst>
-            <pc:docMk/>
-            <pc:sldMk cId="405315113" sldId="405"/>
-            <ac:spMk id="7" creationId="{B928474F-C308-49DB-B143-2878C2302A62}"/>
-          </ac:spMkLst>
-        </pc:spChg>
-        <pc:spChg chg="add mod">
-          <ac:chgData name="Liam Hill" userId="cf4eacb2-5eb2-4c8d-8100-2f2500eca56b" providerId="ADAL" clId="{866E4030-04E4-443C-BDCF-B74C0CDE85E1}" dt="2025-06-10T19:10:52.638" v="653" actId="1076"/>
-          <ac:spMkLst>
-            <pc:docMk/>
-            <pc:sldMk cId="405315113" sldId="405"/>
-            <ac:spMk id="8" creationId="{72F55B3E-EC66-4506-A99E-37902A19EBC2}"/>
-          </ac:spMkLst>
-        </pc:spChg>
-        <pc:spChg chg="add mod">
-          <ac:chgData name="Liam Hill" userId="cf4eacb2-5eb2-4c8d-8100-2f2500eca56b" providerId="ADAL" clId="{866E4030-04E4-443C-BDCF-B74C0CDE85E1}" dt="2025-06-10T19:10:52.638" v="653" actId="1076"/>
-          <ac:spMkLst>
-            <pc:docMk/>
-            <pc:sldMk cId="405315113" sldId="405"/>
-            <ac:spMk id="9" creationId="{F390F4BC-F795-498A-B228-57D06EDAB980}"/>
-          </ac:spMkLst>
-        </pc:spChg>
-        <pc:spChg chg="add mod">
-          <ac:chgData name="Liam Hill" userId="cf4eacb2-5eb2-4c8d-8100-2f2500eca56b" providerId="ADAL" clId="{866E4030-04E4-443C-BDCF-B74C0CDE85E1}" dt="2025-06-10T19:10:52.638" v="653" actId="1076"/>
-          <ac:spMkLst>
-            <pc:docMk/>
-            <pc:sldMk cId="405315113" sldId="405"/>
-            <ac:spMk id="10" creationId="{2604A580-BBD0-4207-9C2A-4FB119F2ED48}"/>
-          </ac:spMkLst>
-        </pc:spChg>
-        <pc:spChg chg="add del mod">
-          <ac:chgData name="Liam Hill" userId="cf4eacb2-5eb2-4c8d-8100-2f2500eca56b" providerId="ADAL" clId="{866E4030-04E4-443C-BDCF-B74C0CDE85E1}" dt="2025-06-10T19:12:15.042" v="671" actId="478"/>
-          <ac:spMkLst>
-            <pc:docMk/>
-            <pc:sldMk cId="405315113" sldId="405"/>
-            <ac:spMk id="11" creationId="{D3257B0F-809B-4044-9575-B70F9314D21C}"/>
-          </ac:spMkLst>
-        </pc:spChg>
-        <pc:spChg chg="add mod">
-          <ac:chgData name="Liam Hill" userId="cf4eacb2-5eb2-4c8d-8100-2f2500eca56b" providerId="ADAL" clId="{866E4030-04E4-443C-BDCF-B74C0CDE85E1}" dt="2025-06-10T19:12:45.264" v="732" actId="20577"/>
-          <ac:spMkLst>
-            <pc:docMk/>
-            <pc:sldMk cId="405315113" sldId="405"/>
-            <ac:spMk id="12" creationId="{469CC2A5-7167-4382-8099-EFA1278BC8A5}"/>
-          </ac:spMkLst>
-        </pc:spChg>
-        <pc:picChg chg="add mod">
-          <ac:chgData name="Liam Hill" userId="cf4eacb2-5eb2-4c8d-8100-2f2500eca56b" providerId="ADAL" clId="{866E4030-04E4-443C-BDCF-B74C0CDE85E1}" dt="2025-06-10T19:10:52.638" v="653" actId="1076"/>
-          <ac:picMkLst>
-            <pc:docMk/>
-            <pc:sldMk cId="405315113" sldId="405"/>
-            <ac:picMk id="5" creationId="{1A5B30E6-CFFE-4FFC-BE3B-5A191410EE91}"/>
-          </ac:picMkLst>
-        </pc:picChg>
       </pc:sldChg>
     </pc:docChg>
   </pc:docChgLst>
 </pc:chgInfo>
+</file>
+
+<file path=ppt/comments/comment1.xml><?xml version="1.0" encoding="utf-8"?>
+<p:cmLst xmlns:a="http://schemas.openxmlformats.org/drawingml/2006/main" xmlns:r="http://schemas.openxmlformats.org/officeDocument/2006/relationships" xmlns:p="http://schemas.openxmlformats.org/presentationml/2006/main">
+  <p:cm authorId="1" dt="2025-06-13T09:50:59.081" idx="19">
+    <p:pos x="10" y="10"/>
+    <p:text>On the website I changed the name of this link. It's SPSS Dataset for Parts 1 and 2.</p:text>
+    <p:extLst>
+      <p:ext uri="{C676402C-5697-4E1C-873F-D02D1690AC5C}">
+        <p15:threadingInfo xmlns:p15="http://schemas.microsoft.com/office/powerpoint/2012/main" timeZoneBias="-60"/>
+      </p:ext>
+    </p:extLst>
+  </p:cm>
+</p:cmLst>
+</file>
+
+<file path=ppt/comments/comment2.xml><?xml version="1.0" encoding="utf-8"?>
+<p:cmLst xmlns:a="http://schemas.openxmlformats.org/drawingml/2006/main" xmlns:r="http://schemas.openxmlformats.org/officeDocument/2006/relationships" xmlns:p="http://schemas.openxmlformats.org/presentationml/2006/main">
+  <p:cm authorId="1" dt="2025-06-13T09:53:30.560" idx="20">
+    <p:pos x="10" y="10"/>
+    <p:text>Presented slides but didn't have time for exercises.</p:text>
+    <p:extLst>
+      <p:ext uri="{C676402C-5697-4E1C-873F-D02D1690AC5C}">
+        <p15:threadingInfo xmlns:p15="http://schemas.microsoft.com/office/powerpoint/2012/main" timeZoneBias="-60"/>
+      </p:ext>
+    </p:extLst>
+  </p:cm>
+</p:cmLst>
 </file>
 
 <file path=ppt/notesMasters/notesMaster1.xml><?xml version="1.0" encoding="utf-8"?>
@@ -481,7 +323,7 @@
           <a:p>
             <a:fld id="{470085E8-8BAE-40DA-B036-0B44F60AADE1}" type="datetimeFigureOut">
               <a:rPr lang="en-US"/>
-              <a:t>6/10/2025</a:t>
+              <a:t>6/13/2025</a:t>
             </a:fld>
             <a:endParaRPr lang="en-US"/>
           </a:p>
@@ -1876,7 +1718,7 @@
             <a:fld id="{1E700B27-DE4C-4B9E-BB11-B9027034A00F}" type="datetimeFigureOut">
               <a:rPr lang="en-US" dirty="0"/>
               <a:pPr/>
-              <a:t>6/10/2025</a:t>
+              <a:t>6/13/2025</a:t>
             </a:fld>
             <a:endParaRPr lang="en-US"/>
           </a:p>
@@ -2994,7 +2836,7 @@
           <a:p>
             <a:fld id="{C40F4739-9812-4A9F-890D-2AD6BA5F6EE8}" type="datetimeFigureOut">
               <a:rPr lang="en-US" dirty="0"/>
-              <a:t>6/10/2025</a:t>
+              <a:t>6/13/2025</a:t>
             </a:fld>
             <a:endParaRPr lang="en-US"/>
           </a:p>
@@ -3941,7 +3783,7 @@
           <a:p>
             <a:fld id="{18845AC5-A3F8-44AA-BA8F-596CDCC976D3}" type="datetimeFigureOut">
               <a:rPr lang="en-US" dirty="0"/>
-              <a:t>6/10/2025</a:t>
+              <a:t>6/13/2025</a:t>
             </a:fld>
             <a:endParaRPr lang="en-US"/>
           </a:p>
@@ -5047,7 +4889,7 @@
           <a:p>
             <a:fld id="{C873B183-A821-4095-A363-9EC968635539}" type="datetimeFigureOut">
               <a:rPr lang="en-US" dirty="0"/>
-              <a:t>6/10/2025</a:t>
+              <a:t>6/13/2025</a:t>
             </a:fld>
             <a:endParaRPr lang="en-US"/>
           </a:p>
@@ -5855,7 +5697,7 @@
           <a:p>
             <a:fld id="{174D01B4-0AA5-45E6-B2E6-5FA4078AEBCF}" type="datetimeFigureOut">
               <a:rPr lang="en-US" dirty="0"/>
-              <a:t>6/10/2025</a:t>
+              <a:t>6/13/2025</a:t>
             </a:fld>
             <a:endParaRPr lang="en-US"/>
           </a:p>
@@ -6500,7 +6342,7 @@
           <a:p>
             <a:fld id="{4147335C-0450-40D7-8612-B3203BED4F28}" type="datetimeFigureOut">
               <a:rPr lang="en-US" dirty="0"/>
-              <a:t>6/10/2025</a:t>
+              <a:t>6/13/2025</a:t>
             </a:fld>
             <a:endParaRPr lang="en-US"/>
           </a:p>
@@ -7343,7 +7185,7 @@
           <a:p>
             <a:fld id="{D246A105-2A1C-4284-B4EA-07CF89B1A393}" type="datetimeFigureOut">
               <a:rPr lang="en-US" dirty="0"/>
-              <a:t>6/10/2025</a:t>
+              <a:t>6/13/2025</a:t>
             </a:fld>
             <a:endParaRPr lang="en-US"/>
           </a:p>
@@ -7516,7 +7358,7 @@
           <a:p>
             <a:fld id="{80DBE609-F3F2-45E6-BD6A-E03A8C86C1AE}" type="datetimeFigureOut">
               <a:rPr lang="en-US" dirty="0"/>
-              <a:t>6/10/2025</a:t>
+              <a:t>6/13/2025</a:t>
             </a:fld>
             <a:endParaRPr lang="en-US"/>
           </a:p>
@@ -8512,7 +8354,7 @@
           <a:p>
             <a:fld id="{7A24AD68-089C-4467-A8F3-EA2BBCA6B44E}" type="datetimeFigureOut">
               <a:rPr lang="en-US" dirty="0"/>
-              <a:t>6/10/2025</a:t>
+              <a:t>6/13/2025</a:t>
             </a:fld>
             <a:endParaRPr lang="en-US"/>
           </a:p>
@@ -8716,7 +8558,7 @@
           <a:p>
             <a:fld id="{75C51FCE-E4BB-4680-8E50-3C0E348D2609}" type="datetimeFigureOut">
               <a:rPr lang="en-US" dirty="0"/>
-              <a:t>6/10/2025</a:t>
+              <a:t>6/13/2025</a:t>
             </a:fld>
             <a:endParaRPr lang="en-US"/>
           </a:p>
@@ -9651,7 +9493,7 @@
           <a:p>
             <a:fld id="{8AAA073D-A903-47F8-8D16-77642FB0DF1F}" type="datetimeFigureOut">
               <a:rPr lang="en-US" dirty="0"/>
-              <a:t>6/10/2025</a:t>
+              <a:t>6/13/2025</a:t>
             </a:fld>
             <a:endParaRPr lang="en-US"/>
           </a:p>
@@ -9920,7 +9762,7 @@
           <a:p>
             <a:fld id="{AB91FA40-626B-4CA1-85D0-7A9016E395BA}" type="datetimeFigureOut">
               <a:rPr lang="en-US" dirty="0"/>
-              <a:t>6/10/2025</a:t>
+              <a:t>6/13/2025</a:t>
             </a:fld>
             <a:endParaRPr lang="en-US"/>
           </a:p>
@@ -10299,7 +10141,7 @@
           <a:p>
             <a:fld id="{C3F425EA-B9DC-48A7-991E-9A82573B1B21}" type="datetimeFigureOut">
               <a:rPr lang="en-US" dirty="0"/>
-              <a:t>6/10/2025</a:t>
+              <a:t>6/13/2025</a:t>
             </a:fld>
             <a:endParaRPr lang="en-US"/>
           </a:p>
@@ -10416,7 +10258,7 @@
           <a:p>
             <a:fld id="{66CB97F8-6CEB-469B-AFCC-889F2A2B1D5A}" type="datetimeFigureOut">
               <a:rPr lang="en-US" dirty="0"/>
-              <a:t>6/10/2025</a:t>
+              <a:t>6/13/2025</a:t>
             </a:fld>
             <a:endParaRPr lang="en-US"/>
           </a:p>
@@ -10511,7 +10353,7 @@
           <a:p>
             <a:fld id="{8FA9179F-009E-4FA5-B091-7EBB82A185BD}" type="datetimeFigureOut">
               <a:rPr lang="en-US" dirty="0"/>
-              <a:t>6/10/2025</a:t>
+              <a:t>6/13/2025</a:t>
             </a:fld>
             <a:endParaRPr lang="en-US"/>
           </a:p>
@@ -11618,7 +11460,7 @@
           <a:p>
             <a:fld id="{8E665CEB-0076-4E37-B880-BCEA9784DE0A}" type="datetimeFigureOut">
               <a:rPr lang="en-US" dirty="0"/>
-              <a:t>6/10/2025</a:t>
+              <a:t>6/13/2025</a:t>
             </a:fld>
             <a:endParaRPr lang="en-US"/>
           </a:p>
@@ -12749,7 +12591,7 @@
           <a:p>
             <a:fld id="{A6149E5E-3896-4118-99A7-7B85668F1C5E}" type="datetimeFigureOut">
               <a:rPr lang="en-US" dirty="0"/>
-              <a:t>6/10/2025</a:t>
+              <a:t>6/13/2025</a:t>
             </a:fld>
             <a:endParaRPr lang="en-US"/>
           </a:p>
@@ -13649,7 +13491,7 @@
           <a:p>
             <a:fld id="{7E0D914D-B099-4142-A885-11F276715148}" type="datetimeFigureOut">
               <a:rPr lang="en-US" dirty="0"/>
-              <a:t>6/10/2025</a:t>
+              <a:t>6/13/2025</a:t>
             </a:fld>
             <a:endParaRPr lang="en-US"/>
           </a:p>
@@ -25558,4 +25400,298 @@
     </a:ext>
   </a:extLst>
 </a:theme>
+</file>
+
+<file path=customXml/item1.xml><?xml version="1.0" encoding="utf-8"?>
+<ct:contentTypeSchema xmlns:ct="http://schemas.microsoft.com/office/2006/metadata/contentType" xmlns:ma="http://schemas.microsoft.com/office/2006/metadata/properties/metaAttributes" ct:_="" ma:_="" ma:contentTypeName="Document" ma:contentTypeID="0x010100BDA48D26F2FF4A428BBBC34A600910EF" ma:contentTypeVersion="15" ma:contentTypeDescription="Create a new document." ma:contentTypeScope="" ma:versionID="e306b047fcbbb773a8c514739bd612a3">
+  <xsd:schema xmlns:xsd="http://www.w3.org/2001/XMLSchema" xmlns:xs="http://www.w3.org/2001/XMLSchema" xmlns:p="http://schemas.microsoft.com/office/2006/metadata/properties" xmlns:ns3="c7289588-b7d1-4ffb-bcbd-032480238586" xmlns:ns4="20a2722d-1839-4416-87fc-dea3757df3fb" targetNamespace="http://schemas.microsoft.com/office/2006/metadata/properties" ma:root="true" ma:fieldsID="3d9345b7798289fc471926e342f1c5b3" ns3:_="" ns4:_="">
+    <xsd:import namespace="c7289588-b7d1-4ffb-bcbd-032480238586"/>
+    <xsd:import namespace="20a2722d-1839-4416-87fc-dea3757df3fb"/>
+    <xsd:element name="properties">
+      <xsd:complexType>
+        <xsd:sequence>
+          <xsd:element name="documentManagement">
+            <xsd:complexType>
+              <xsd:all>
+                <xsd:element ref="ns3:_activity" minOccurs="0"/>
+                <xsd:element ref="ns4:SharedWithUsers" minOccurs="0"/>
+                <xsd:element ref="ns4:SharedWithDetails" minOccurs="0"/>
+                <xsd:element ref="ns4:SharingHintHash" minOccurs="0"/>
+                <xsd:element ref="ns3:MediaServiceMetadata" minOccurs="0"/>
+                <xsd:element ref="ns3:MediaServiceFastMetadata" minOccurs="0"/>
+                <xsd:element ref="ns3:MediaServiceObjectDetectorVersions" minOccurs="0"/>
+                <xsd:element ref="ns3:MediaServiceSearchProperties" minOccurs="0"/>
+                <xsd:element ref="ns3:MediaServiceSystemTags" minOccurs="0"/>
+                <xsd:element ref="ns3:MediaServiceOCR" minOccurs="0"/>
+                <xsd:element ref="ns3:MediaServiceGenerationTime" minOccurs="0"/>
+                <xsd:element ref="ns3:MediaServiceEventHashCode" minOccurs="0"/>
+                <xsd:element ref="ns3:MediaServiceDateTaken" minOccurs="0"/>
+                <xsd:element ref="ns3:MediaLengthInSeconds" minOccurs="0"/>
+                <xsd:element ref="ns3:MediaServiceLocation" minOccurs="0"/>
+              </xsd:all>
+            </xsd:complexType>
+          </xsd:element>
+        </xsd:sequence>
+      </xsd:complexType>
+    </xsd:element>
+  </xsd:schema>
+  <xsd:schema xmlns:xsd="http://www.w3.org/2001/XMLSchema" xmlns:xs="http://www.w3.org/2001/XMLSchema" xmlns:dms="http://schemas.microsoft.com/office/2006/documentManagement/types" xmlns:pc="http://schemas.microsoft.com/office/infopath/2007/PartnerControls" targetNamespace="c7289588-b7d1-4ffb-bcbd-032480238586" elementFormDefault="qualified">
+    <xsd:import namespace="http://schemas.microsoft.com/office/2006/documentManagement/types"/>
+    <xsd:import namespace="http://schemas.microsoft.com/office/infopath/2007/PartnerControls"/>
+    <xsd:element name="_activity" ma:index="8" nillable="true" ma:displayName="_activity" ma:hidden="true" ma:internalName="_activity">
+      <xsd:simpleType>
+        <xsd:restriction base="dms:Note"/>
+      </xsd:simpleType>
+    </xsd:element>
+    <xsd:element name="MediaServiceMetadata" ma:index="12" nillable="true" ma:displayName="MediaServiceMetadata" ma:hidden="true" ma:internalName="MediaServiceMetadata" ma:readOnly="true">
+      <xsd:simpleType>
+        <xsd:restriction base="dms:Note"/>
+      </xsd:simpleType>
+    </xsd:element>
+    <xsd:element name="MediaServiceFastMetadata" ma:index="13" nillable="true" ma:displayName="MediaServiceFastMetadata" ma:hidden="true" ma:internalName="MediaServiceFastMetadata" ma:readOnly="true">
+      <xsd:simpleType>
+        <xsd:restriction base="dms:Note"/>
+      </xsd:simpleType>
+    </xsd:element>
+    <xsd:element name="MediaServiceObjectDetectorVersions" ma:index="14" nillable="true" ma:displayName="MediaServiceObjectDetectorVersions" ma:hidden="true" ma:indexed="true" ma:internalName="MediaServiceObjectDetectorVersions" ma:readOnly="true">
+      <xsd:simpleType>
+        <xsd:restriction base="dms:Text"/>
+      </xsd:simpleType>
+    </xsd:element>
+    <xsd:element name="MediaServiceSearchProperties" ma:index="15" nillable="true" ma:displayName="MediaServiceSearchProperties" ma:hidden="true" ma:internalName="MediaServiceSearchProperties" ma:readOnly="true">
+      <xsd:simpleType>
+        <xsd:restriction base="dms:Note"/>
+      </xsd:simpleType>
+    </xsd:element>
+    <xsd:element name="MediaServiceSystemTags" ma:index="16" nillable="true" ma:displayName="MediaServiceSystemTags" ma:hidden="true" ma:internalName="MediaServiceSystemTags" ma:readOnly="true">
+      <xsd:simpleType>
+        <xsd:restriction base="dms:Note"/>
+      </xsd:simpleType>
+    </xsd:element>
+    <xsd:element name="MediaServiceOCR" ma:index="17" nillable="true" ma:displayName="Extracted Text" ma:internalName="MediaServiceOCR" ma:readOnly="true">
+      <xsd:simpleType>
+        <xsd:restriction base="dms:Note">
+          <xsd:maxLength value="255"/>
+        </xsd:restriction>
+      </xsd:simpleType>
+    </xsd:element>
+    <xsd:element name="MediaServiceGenerationTime" ma:index="18" nillable="true" ma:displayName="MediaServiceGenerationTime" ma:hidden="true" ma:internalName="MediaServiceGenerationTime" ma:readOnly="true">
+      <xsd:simpleType>
+        <xsd:restriction base="dms:Text"/>
+      </xsd:simpleType>
+    </xsd:element>
+    <xsd:element name="MediaServiceEventHashCode" ma:index="19" nillable="true" ma:displayName="MediaServiceEventHashCode" ma:hidden="true" ma:internalName="MediaServiceEventHashCode" ma:readOnly="true">
+      <xsd:simpleType>
+        <xsd:restriction base="dms:Text"/>
+      </xsd:simpleType>
+    </xsd:element>
+    <xsd:element name="MediaServiceDateTaken" ma:index="20" nillable="true" ma:displayName="MediaServiceDateTaken" ma:hidden="true" ma:indexed="true" ma:internalName="MediaServiceDateTaken" ma:readOnly="true">
+      <xsd:simpleType>
+        <xsd:restriction base="dms:Text"/>
+      </xsd:simpleType>
+    </xsd:element>
+    <xsd:element name="MediaLengthInSeconds" ma:index="21" nillable="true" ma:displayName="MediaLengthInSeconds" ma:hidden="true" ma:internalName="MediaLengthInSeconds" ma:readOnly="true">
+      <xsd:simpleType>
+        <xsd:restriction base="dms:Unknown"/>
+      </xsd:simpleType>
+    </xsd:element>
+    <xsd:element name="MediaServiceLocation" ma:index="22" nillable="true" ma:displayName="Location" ma:indexed="true" ma:internalName="MediaServiceLocation" ma:readOnly="true">
+      <xsd:simpleType>
+        <xsd:restriction base="dms:Text"/>
+      </xsd:simpleType>
+    </xsd:element>
+  </xsd:schema>
+  <xsd:schema xmlns:xsd="http://www.w3.org/2001/XMLSchema" xmlns:xs="http://www.w3.org/2001/XMLSchema" xmlns:dms="http://schemas.microsoft.com/office/2006/documentManagement/types" xmlns:pc="http://schemas.microsoft.com/office/infopath/2007/PartnerControls" targetNamespace="20a2722d-1839-4416-87fc-dea3757df3fb" elementFormDefault="qualified">
+    <xsd:import namespace="http://schemas.microsoft.com/office/2006/documentManagement/types"/>
+    <xsd:import namespace="http://schemas.microsoft.com/office/infopath/2007/PartnerControls"/>
+    <xsd:element name="SharedWithUsers" ma:index="9" nillable="true" ma:displayName="Shared With" ma:internalName="SharedWithUsers" ma:readOnly="true">
+      <xsd:complexType>
+        <xsd:complexContent>
+          <xsd:extension base="dms:UserMulti">
+            <xsd:sequence>
+              <xsd:element name="UserInfo" minOccurs="0" maxOccurs="unbounded">
+                <xsd:complexType>
+                  <xsd:sequence>
+                    <xsd:element name="DisplayName" type="xsd:string" minOccurs="0"/>
+                    <xsd:element name="AccountId" type="dms:UserId" minOccurs="0" nillable="true"/>
+                    <xsd:element name="AccountType" type="xsd:string" minOccurs="0"/>
+                  </xsd:sequence>
+                </xsd:complexType>
+              </xsd:element>
+            </xsd:sequence>
+          </xsd:extension>
+        </xsd:complexContent>
+      </xsd:complexType>
+    </xsd:element>
+    <xsd:element name="SharedWithDetails" ma:index="10" nillable="true" ma:displayName="Shared With Details" ma:internalName="SharedWithDetails" ma:readOnly="true">
+      <xsd:simpleType>
+        <xsd:restriction base="dms:Note">
+          <xsd:maxLength value="255"/>
+        </xsd:restriction>
+      </xsd:simpleType>
+    </xsd:element>
+    <xsd:element name="SharingHintHash" ma:index="11" nillable="true" ma:displayName="Sharing Hint Hash" ma:hidden="true" ma:internalName="SharingHintHash" ma:readOnly="true">
+      <xsd:simpleType>
+        <xsd:restriction base="dms:Text"/>
+      </xsd:simpleType>
+    </xsd:element>
+  </xsd:schema>
+  <xsd:schema xmlns="http://schemas.openxmlformats.org/package/2006/metadata/core-properties" xmlns:xsd="http://www.w3.org/2001/XMLSchema" xmlns:xsi="http://www.w3.org/2001/XMLSchema-instance" xmlns:dc="http://purl.org/dc/elements/1.1/" xmlns:dcterms="http://purl.org/dc/terms/" xmlns:odoc="http://schemas.microsoft.com/internal/obd" targetNamespace="http://schemas.openxmlformats.org/package/2006/metadata/core-properties" elementFormDefault="qualified" attributeFormDefault="unqualified" blockDefault="#all">
+    <xsd:import namespace="http://purl.org/dc/elements/1.1/" schemaLocation="http://dublincore.org/schemas/xmls/qdc/2003/04/02/dc.xsd"/>
+    <xsd:import namespace="http://purl.org/dc/terms/" schemaLocation="http://dublincore.org/schemas/xmls/qdc/2003/04/02/dcterms.xsd"/>
+    <xsd:element name="coreProperties" type="CT_coreProperties"/>
+    <xsd:complexType name="CT_coreProperties">
+      <xsd:all>
+        <xsd:element ref="dc:creator" minOccurs="0" maxOccurs="1"/>
+        <xsd:element ref="dcterms:created" minOccurs="0" maxOccurs="1"/>
+        <xsd:element ref="dc:identifier" minOccurs="0" maxOccurs="1"/>
+        <xsd:element name="contentType" minOccurs="0" maxOccurs="1" type="xsd:string" ma:index="0" ma:displayName="Content Type"/>
+        <xsd:element ref="dc:title" minOccurs="0" maxOccurs="1" ma:index="4" ma:displayName="Title"/>
+        <xsd:element ref="dc:subject" minOccurs="0" maxOccurs="1"/>
+        <xsd:element ref="dc:description" minOccurs="0" maxOccurs="1"/>
+        <xsd:element name="keywords" minOccurs="0" maxOccurs="1" type="xsd:string"/>
+        <xsd:element ref="dc:language" minOccurs="0" maxOccurs="1"/>
+        <xsd:element name="category" minOccurs="0" maxOccurs="1" type="xsd:string"/>
+        <xsd:element name="version" minOccurs="0" maxOccurs="1" type="xsd:string"/>
+        <xsd:element name="revision" minOccurs="0" maxOccurs="1" type="xsd:string">
+          <xsd:annotation>
+            <xsd:documentation>
+                        This value indicates the number of saves or revisions. The application is responsible for updating this value after each revision.
+                    </xsd:documentation>
+          </xsd:annotation>
+        </xsd:element>
+        <xsd:element name="lastModifiedBy" minOccurs="0" maxOccurs="1" type="xsd:string"/>
+        <xsd:element ref="dcterms:modified" minOccurs="0" maxOccurs="1"/>
+        <xsd:element name="contentStatus" minOccurs="0" maxOccurs="1" type="xsd:string"/>
+      </xsd:all>
+    </xsd:complexType>
+  </xsd:schema>
+  <xs:schema xmlns:pc="http://schemas.microsoft.com/office/infopath/2007/PartnerControls" xmlns:xs="http://www.w3.org/2001/XMLSchema" targetNamespace="http://schemas.microsoft.com/office/infopath/2007/PartnerControls" elementFormDefault="qualified" attributeFormDefault="unqualified">
+    <xs:element name="Person">
+      <xs:complexType>
+        <xs:sequence>
+          <xs:element ref="pc:DisplayName" minOccurs="0"/>
+          <xs:element ref="pc:AccountId" minOccurs="0"/>
+          <xs:element ref="pc:AccountType" minOccurs="0"/>
+        </xs:sequence>
+      </xs:complexType>
+    </xs:element>
+    <xs:element name="DisplayName" type="xs:string"/>
+    <xs:element name="AccountId" type="xs:string"/>
+    <xs:element name="AccountType" type="xs:string"/>
+    <xs:element name="BDCAssociatedEntity">
+      <xs:complexType>
+        <xs:sequence>
+          <xs:element ref="pc:BDCEntity" minOccurs="0" maxOccurs="unbounded"/>
+        </xs:sequence>
+        <xs:attribute ref="pc:EntityNamespace"/>
+        <xs:attribute ref="pc:EntityName"/>
+        <xs:attribute ref="pc:SystemInstanceName"/>
+        <xs:attribute ref="pc:AssociationName"/>
+      </xs:complexType>
+    </xs:element>
+    <xs:attribute name="EntityNamespace" type="xs:string"/>
+    <xs:attribute name="EntityName" type="xs:string"/>
+    <xs:attribute name="SystemInstanceName" type="xs:string"/>
+    <xs:attribute name="AssociationName" type="xs:string"/>
+    <xs:element name="BDCEntity">
+      <xs:complexType>
+        <xs:sequence>
+          <xs:element ref="pc:EntityDisplayName" minOccurs="0"/>
+          <xs:element ref="pc:EntityInstanceReference" minOccurs="0"/>
+          <xs:element ref="pc:EntityId1" minOccurs="0"/>
+          <xs:element ref="pc:EntityId2" minOccurs="0"/>
+          <xs:element ref="pc:EntityId3" minOccurs="0"/>
+          <xs:element ref="pc:EntityId4" minOccurs="0"/>
+          <xs:element ref="pc:EntityId5" minOccurs="0"/>
+        </xs:sequence>
+      </xs:complexType>
+    </xs:element>
+    <xs:element name="EntityDisplayName" type="xs:string"/>
+    <xs:element name="EntityInstanceReference" type="xs:string"/>
+    <xs:element name="EntityId1" type="xs:string"/>
+    <xs:element name="EntityId2" type="xs:string"/>
+    <xs:element name="EntityId3" type="xs:string"/>
+    <xs:element name="EntityId4" type="xs:string"/>
+    <xs:element name="EntityId5" type="xs:string"/>
+    <xs:element name="Terms">
+      <xs:complexType>
+        <xs:sequence>
+          <xs:element ref="pc:TermInfo" minOccurs="0" maxOccurs="unbounded"/>
+        </xs:sequence>
+      </xs:complexType>
+    </xs:element>
+    <xs:element name="TermInfo">
+      <xs:complexType>
+        <xs:sequence>
+          <xs:element ref="pc:TermName" minOccurs="0"/>
+          <xs:element ref="pc:TermId" minOccurs="0"/>
+        </xs:sequence>
+      </xs:complexType>
+    </xs:element>
+    <xs:element name="TermName" type="xs:string"/>
+    <xs:element name="TermId" type="xs:string"/>
+  </xs:schema>
+</ct:contentTypeSchema>
+</file>
+
+<file path=customXml/item2.xml><?xml version="1.0" encoding="utf-8"?>
+<?mso-contentType ?>
+<FormTemplates xmlns="http://schemas.microsoft.com/sharepoint/v3/contenttype/forms">
+  <Display>DocumentLibraryForm</Display>
+  <Edit>DocumentLibraryForm</Edit>
+  <New>DocumentLibraryForm</New>
+</FormTemplates>
+</file>
+
+<file path=customXml/item3.xml><?xml version="1.0" encoding="utf-8"?>
+<p:properties xmlns:p="http://schemas.microsoft.com/office/2006/metadata/properties" xmlns:xsi="http://www.w3.org/2001/XMLSchema-instance" xmlns:pc="http://schemas.microsoft.com/office/infopath/2007/PartnerControls">
+  <documentManagement>
+    <_activity xmlns="c7289588-b7d1-4ffb-bcbd-032480238586" xsi:nil="true"/>
+  </documentManagement>
+</p:properties>
+</file>
+
+<file path=customXml/itemProps1.xml><?xml version="1.0" encoding="utf-8"?>
+<ds:datastoreItem xmlns:ds="http://schemas.openxmlformats.org/officeDocument/2006/customXml" ds:itemID="{E7C6704E-DF92-4167-9944-871355F2C73B}">
+  <ds:schemaRefs>
+    <ds:schemaRef ds:uri="http://schemas.microsoft.com/office/2006/metadata/contentType"/>
+    <ds:schemaRef ds:uri="http://schemas.microsoft.com/office/2006/metadata/properties/metaAttributes"/>
+    <ds:schemaRef ds:uri="http://www.w3.org/2001/XMLSchema"/>
+    <ds:schemaRef ds:uri="http://schemas.microsoft.com/office/2006/metadata/properties"/>
+    <ds:schemaRef ds:uri="c7289588-b7d1-4ffb-bcbd-032480238586"/>
+    <ds:schemaRef ds:uri="20a2722d-1839-4416-87fc-dea3757df3fb"/>
+    <ds:schemaRef ds:uri="http://schemas.microsoft.com/office/2006/documentManagement/types"/>
+    <ds:schemaRef ds:uri="http://schemas.microsoft.com/office/infopath/2007/PartnerControls"/>
+    <ds:schemaRef ds:uri="http://schemas.openxmlformats.org/package/2006/metadata/core-properties"/>
+    <ds:schemaRef ds:uri="http://purl.org/dc/elements/1.1/"/>
+    <ds:schemaRef ds:uri="http://purl.org/dc/terms/"/>
+    <ds:schemaRef ds:uri="http://schemas.microsoft.com/internal/obd"/>
+  </ds:schemaRefs>
+</ds:datastoreItem>
+</file>
+
+<file path=customXml/itemProps2.xml><?xml version="1.0" encoding="utf-8"?>
+<ds:datastoreItem xmlns:ds="http://schemas.openxmlformats.org/officeDocument/2006/customXml" ds:itemID="{E2716E90-F299-4E14-8197-D93EAF68DCF6}">
+  <ds:schemaRefs>
+    <ds:schemaRef ds:uri="http://schemas.microsoft.com/sharepoint/v3/contenttype/forms"/>
+  </ds:schemaRefs>
+</ds:datastoreItem>
+</file>
+
+<file path=customXml/itemProps3.xml><?xml version="1.0" encoding="utf-8"?>
+<ds:datastoreItem xmlns:ds="http://schemas.openxmlformats.org/officeDocument/2006/customXml" ds:itemID="{124B03D1-3216-42A4-8957-354293514145}">
+  <ds:schemaRefs>
+    <ds:schemaRef ds:uri="http://purl.org/dc/elements/1.1/"/>
+    <ds:schemaRef ds:uri="http://schemas.openxmlformats.org/package/2006/metadata/core-properties"/>
+    <ds:schemaRef ds:uri="http://www.w3.org/XML/1998/namespace"/>
+    <ds:schemaRef ds:uri="http://schemas.microsoft.com/office/infopath/2007/PartnerControls"/>
+    <ds:schemaRef ds:uri="http://schemas.microsoft.com/office/2006/documentManagement/types"/>
+    <ds:schemaRef ds:uri="http://purl.org/dc/terms/"/>
+    <ds:schemaRef ds:uri="c7289588-b7d1-4ffb-bcbd-032480238586"/>
+    <ds:schemaRef ds:uri="20a2722d-1839-4416-87fc-dea3757df3fb"/>
+    <ds:schemaRef ds:uri="http://schemas.microsoft.com/office/2006/metadata/properties"/>
+    <ds:schemaRef ds:uri="http://purl.org/dc/dcmitype/"/>
+  </ds:schemaRefs>
+</ds:datastoreItem>
 </file>
</xml_diff>